<commit_message>
solve problem with tableId and tableIndex
</commit_message>
<xml_diff>
--- a/exercise2/DPDCAssignment2Group01.pptx
+++ b/exercise2/DPDCAssignment2Group01.pptx
@@ -6666,12 +6666,27 @@
               <a:rPr lang="en-US" dirty="0" smtClean="0"/>
               <a:t>Result: 4min?</a:t>
             </a:r>
+            <a:endParaRPr lang="en-US" dirty="0"/>
           </a:p>
           <a:p>
             <a:pPr marL="285750" indent="-285750">
               <a:buFont typeface="Arial"/>
               <a:buChar char="•"/>
             </a:pPr>
+            <a:r>
+              <a:rPr lang="en-US" dirty="0" smtClean="0"/>
+              <a:t>No, we could do better</a:t>
+            </a:r>
+          </a:p>
+          <a:p>
+            <a:pPr marL="731838" lvl="1" indent="-285750">
+              <a:buFont typeface="Arial"/>
+              <a:buChar char="•"/>
+            </a:pPr>
+            <a:r>
+              <a:rPr lang="en-US" dirty="0" smtClean="0"/>
+              <a:t>3min</a:t>
+            </a:r>
             <a:endParaRPr lang="en-US" dirty="0"/>
           </a:p>
           <a:p>
@@ -6681,7 +6696,7 @@
             </a:pPr>
             <a:r>
               <a:rPr lang="en-US" dirty="0" smtClean="0"/>
-              <a:t>No, we could do better</a:t>
+              <a:t>Reading small files first</a:t>
             </a:r>
           </a:p>
           <a:p>
@@ -6691,7 +6706,7 @@
             </a:pPr>
             <a:r>
               <a:rPr lang="en-US" dirty="0" smtClean="0"/>
-              <a:t>3min</a:t>
+              <a:t>we get a lot of INDs very fast</a:t>
             </a:r>
           </a:p>
           <a:p>
@@ -6699,6 +6714,10 @@
               <a:buFont typeface="Arial"/>
               <a:buChar char="•"/>
             </a:pPr>
+            <a:r>
+              <a:rPr lang="en-US" dirty="0" smtClean="0"/>
+              <a:t>Graph?</a:t>
+            </a:r>
             <a:endParaRPr lang="en-US" dirty="0"/>
           </a:p>
           <a:p>
@@ -6708,27 +6727,15 @@
             </a:pPr>
             <a:r>
               <a:rPr lang="en-US" dirty="0" smtClean="0"/>
-              <a:t>Reading small files first</a:t>
-            </a:r>
-          </a:p>
-          <a:p>
-            <a:pPr marL="731838" lvl="1" indent="-285750">
-              <a:buFont typeface="Arial"/>
-              <a:buChar char="•"/>
-            </a:pPr>
+              <a:t>cons: memory usage increases linearly with data size (</a:t>
+            </a:r>
+            <a:r>
+              <a:rPr lang="en-US" dirty="0" err="1" smtClean="0"/>
+              <a:t>uniques</a:t>
+            </a:r>
             <a:r>
               <a:rPr lang="en-US" dirty="0" smtClean="0"/>
-              <a:t>we get a lot of INDs very fast</a:t>
-            </a:r>
-          </a:p>
-          <a:p>
-            <a:pPr marL="731838" lvl="1" indent="-285750">
-              <a:buFont typeface="Arial"/>
-              <a:buChar char="•"/>
-            </a:pPr>
-            <a:r>
-              <a:rPr lang="en-US" dirty="0" smtClean="0"/>
-              <a:t>Graph?</a:t>
+              <a:t>)</a:t>
             </a:r>
           </a:p>
         </p:txBody>

</xml_diff>

<commit_message>
finished Markus' part of presentation2
</commit_message>
<xml_diff>
--- a/exercise2/DPDCAssignment2Group01.pptx
+++ b/exercise2/DPDCAssignment2Group01.pptx
@@ -11061,6 +11061,909 @@
           </a:p>
         </p:txBody>
       </p:sp>
+      <p:sp>
+        <p:nvSpPr>
+          <p:cNvPr id="6" name="Footer Placeholder 3"/>
+          <p:cNvSpPr txBox="1">
+            <a:spLocks/>
+          </p:cNvSpPr>
+          <p:nvPr/>
+        </p:nvSpPr>
+        <p:spPr bwMode="auto">
+          <a:xfrm>
+            <a:off x="719138" y="6561138"/>
+            <a:ext cx="8172450" cy="252412"/>
+          </a:xfrm>
+          <a:prstGeom prst="rect">
+            <a:avLst/>
+          </a:prstGeom>
+          <a:noFill/>
+          <a:ln w="9525">
+            <a:noFill/>
+            <a:miter lim="800000"/>
+            <a:headEnd/>
+            <a:tailEnd/>
+          </a:ln>
+          <a:effectLst/>
+        </p:spPr>
+        <p:txBody>
+          <a:bodyPr vert="horz" wrap="square" lIns="0" tIns="0" rIns="0" bIns="0" numCol="1" anchor="b" anchorCtr="0" compatLnSpc="1">
+            <a:prstTxWarp prst="textNoShape">
+              <a:avLst/>
+            </a:prstTxWarp>
+          </a:bodyPr>
+          <a:lstStyle>
+            <a:defPPr>
+              <a:defRPr lang="de-DE"/>
+            </a:defPPr>
+            <a:lvl1pPr algn="l" rtl="0" fontAlgn="base">
+              <a:spcBef>
+                <a:spcPct val="0"/>
+              </a:spcBef>
+              <a:spcAft>
+                <a:spcPct val="0"/>
+              </a:spcAft>
+              <a:defRPr sz="1400" kern="1200">
+                <a:solidFill>
+                  <a:schemeClr val="bg2"/>
+                </a:solidFill>
+                <a:latin typeface="+mn-lt"/>
+                <a:ea typeface="+mn-ea"/>
+                <a:cs typeface="+mn-cs"/>
+              </a:defRPr>
+            </a:lvl1pPr>
+            <a:lvl2pPr marL="457200" algn="ctr" rtl="0" fontAlgn="base">
+              <a:spcBef>
+                <a:spcPct val="0"/>
+              </a:spcBef>
+              <a:spcAft>
+                <a:spcPct val="0"/>
+              </a:spcAft>
+              <a:defRPr kern="1200">
+                <a:solidFill>
+                  <a:schemeClr val="bg1"/>
+                </a:solidFill>
+                <a:latin typeface="Verdana" pitchFamily="34" charset="0"/>
+                <a:ea typeface="+mn-ea"/>
+                <a:cs typeface="+mn-cs"/>
+              </a:defRPr>
+            </a:lvl2pPr>
+            <a:lvl3pPr marL="914400" algn="ctr" rtl="0" fontAlgn="base">
+              <a:spcBef>
+                <a:spcPct val="0"/>
+              </a:spcBef>
+              <a:spcAft>
+                <a:spcPct val="0"/>
+              </a:spcAft>
+              <a:defRPr kern="1200">
+                <a:solidFill>
+                  <a:schemeClr val="bg1"/>
+                </a:solidFill>
+                <a:latin typeface="Verdana" pitchFamily="34" charset="0"/>
+                <a:ea typeface="+mn-ea"/>
+                <a:cs typeface="+mn-cs"/>
+              </a:defRPr>
+            </a:lvl3pPr>
+            <a:lvl4pPr marL="1371600" algn="ctr" rtl="0" fontAlgn="base">
+              <a:spcBef>
+                <a:spcPct val="0"/>
+              </a:spcBef>
+              <a:spcAft>
+                <a:spcPct val="0"/>
+              </a:spcAft>
+              <a:defRPr kern="1200">
+                <a:solidFill>
+                  <a:schemeClr val="bg1"/>
+                </a:solidFill>
+                <a:latin typeface="Verdana" pitchFamily="34" charset="0"/>
+                <a:ea typeface="+mn-ea"/>
+                <a:cs typeface="+mn-cs"/>
+              </a:defRPr>
+            </a:lvl4pPr>
+            <a:lvl5pPr marL="1828800" algn="ctr" rtl="0" fontAlgn="base">
+              <a:spcBef>
+                <a:spcPct val="0"/>
+              </a:spcBef>
+              <a:spcAft>
+                <a:spcPct val="0"/>
+              </a:spcAft>
+              <a:defRPr kern="1200">
+                <a:solidFill>
+                  <a:schemeClr val="bg1"/>
+                </a:solidFill>
+                <a:latin typeface="Verdana" pitchFamily="34" charset="0"/>
+                <a:ea typeface="+mn-ea"/>
+                <a:cs typeface="+mn-cs"/>
+              </a:defRPr>
+            </a:lvl5pPr>
+            <a:lvl6pPr marL="2286000" algn="l" defTabSz="914400" rtl="0" eaLnBrk="1" latinLnBrk="0" hangingPunct="1">
+              <a:defRPr kern="1200">
+                <a:solidFill>
+                  <a:schemeClr val="bg1"/>
+                </a:solidFill>
+                <a:latin typeface="Verdana" pitchFamily="34" charset="0"/>
+                <a:ea typeface="+mn-ea"/>
+                <a:cs typeface="+mn-cs"/>
+              </a:defRPr>
+            </a:lvl6pPr>
+            <a:lvl7pPr marL="2743200" algn="l" defTabSz="914400" rtl="0" eaLnBrk="1" latinLnBrk="0" hangingPunct="1">
+              <a:defRPr kern="1200">
+                <a:solidFill>
+                  <a:schemeClr val="bg1"/>
+                </a:solidFill>
+                <a:latin typeface="Verdana" pitchFamily="34" charset="0"/>
+                <a:ea typeface="+mn-ea"/>
+                <a:cs typeface="+mn-cs"/>
+              </a:defRPr>
+            </a:lvl7pPr>
+            <a:lvl8pPr marL="3200400" algn="l" defTabSz="914400" rtl="0" eaLnBrk="1" latinLnBrk="0" hangingPunct="1">
+              <a:defRPr kern="1200">
+                <a:solidFill>
+                  <a:schemeClr val="bg1"/>
+                </a:solidFill>
+                <a:latin typeface="Verdana" pitchFamily="34" charset="0"/>
+                <a:ea typeface="+mn-ea"/>
+                <a:cs typeface="+mn-cs"/>
+              </a:defRPr>
+            </a:lvl8pPr>
+            <a:lvl9pPr marL="3657600" algn="l" defTabSz="914400" rtl="0" eaLnBrk="1" latinLnBrk="0" hangingPunct="1">
+              <a:defRPr kern="1200">
+                <a:solidFill>
+                  <a:schemeClr val="bg1"/>
+                </a:solidFill>
+                <a:latin typeface="Verdana" pitchFamily="34" charset="0"/>
+                <a:ea typeface="+mn-ea"/>
+                <a:cs typeface="+mn-cs"/>
+              </a:defRPr>
+            </a:lvl9pPr>
+          </a:lstStyle>
+          <a:p>
+            <a:r>
+              <a:rPr lang="de-DE" smtClean="0"/>
+              <a:t>DPDC – Assignment 1 | Christoph Oehlke, Markus Hinsche | May 16, 2013 </a:t>
+            </a:r>
+            <a:endParaRPr lang="de-DE"/>
+          </a:p>
+        </p:txBody>
+      </p:sp>
+      <p:sp>
+        <p:nvSpPr>
+          <p:cNvPr id="7" name="Slide Number Placeholder 4"/>
+          <p:cNvSpPr txBox="1">
+            <a:spLocks/>
+          </p:cNvSpPr>
+          <p:nvPr/>
+        </p:nvSpPr>
+        <p:spPr bwMode="auto">
+          <a:xfrm>
+            <a:off x="-166688" y="1439863"/>
+            <a:ext cx="547688" cy="333375"/>
+          </a:xfrm>
+          <a:prstGeom prst="rect">
+            <a:avLst/>
+          </a:prstGeom>
+          <a:noFill/>
+          <a:ln w="9525">
+            <a:noFill/>
+            <a:miter lim="800000"/>
+            <a:headEnd/>
+            <a:tailEnd/>
+          </a:ln>
+          <a:effectLst/>
+        </p:spPr>
+        <p:txBody>
+          <a:bodyPr vert="horz" wrap="square" lIns="0" tIns="0" rIns="0" bIns="0" numCol="1" anchor="t" anchorCtr="0" compatLnSpc="1">
+            <a:prstTxWarp prst="textNoShape">
+              <a:avLst/>
+            </a:prstTxWarp>
+          </a:bodyPr>
+          <a:lstStyle>
+            <a:defPPr>
+              <a:defRPr lang="de-DE"/>
+            </a:defPPr>
+            <a:lvl1pPr algn="r" rtl="0" fontAlgn="base">
+              <a:spcBef>
+                <a:spcPct val="0"/>
+              </a:spcBef>
+              <a:spcAft>
+                <a:spcPct val="0"/>
+              </a:spcAft>
+              <a:defRPr sz="1400" kern="1200">
+                <a:solidFill>
+                  <a:schemeClr val="tx2"/>
+                </a:solidFill>
+                <a:latin typeface="Verdana" pitchFamily="34" charset="0"/>
+                <a:ea typeface="+mn-ea"/>
+                <a:cs typeface="+mn-cs"/>
+              </a:defRPr>
+            </a:lvl1pPr>
+            <a:lvl2pPr marL="457200" algn="ctr" rtl="0" fontAlgn="base">
+              <a:spcBef>
+                <a:spcPct val="0"/>
+              </a:spcBef>
+              <a:spcAft>
+                <a:spcPct val="0"/>
+              </a:spcAft>
+              <a:defRPr kern="1200">
+                <a:solidFill>
+                  <a:schemeClr val="bg1"/>
+                </a:solidFill>
+                <a:latin typeface="Verdana" pitchFamily="34" charset="0"/>
+                <a:ea typeface="+mn-ea"/>
+                <a:cs typeface="+mn-cs"/>
+              </a:defRPr>
+            </a:lvl2pPr>
+            <a:lvl3pPr marL="914400" algn="ctr" rtl="0" fontAlgn="base">
+              <a:spcBef>
+                <a:spcPct val="0"/>
+              </a:spcBef>
+              <a:spcAft>
+                <a:spcPct val="0"/>
+              </a:spcAft>
+              <a:defRPr kern="1200">
+                <a:solidFill>
+                  <a:schemeClr val="bg1"/>
+                </a:solidFill>
+                <a:latin typeface="Verdana" pitchFamily="34" charset="0"/>
+                <a:ea typeface="+mn-ea"/>
+                <a:cs typeface="+mn-cs"/>
+              </a:defRPr>
+            </a:lvl3pPr>
+            <a:lvl4pPr marL="1371600" algn="ctr" rtl="0" fontAlgn="base">
+              <a:spcBef>
+                <a:spcPct val="0"/>
+              </a:spcBef>
+              <a:spcAft>
+                <a:spcPct val="0"/>
+              </a:spcAft>
+              <a:defRPr kern="1200">
+                <a:solidFill>
+                  <a:schemeClr val="bg1"/>
+                </a:solidFill>
+                <a:latin typeface="Verdana" pitchFamily="34" charset="0"/>
+                <a:ea typeface="+mn-ea"/>
+                <a:cs typeface="+mn-cs"/>
+              </a:defRPr>
+            </a:lvl4pPr>
+            <a:lvl5pPr marL="1828800" algn="ctr" rtl="0" fontAlgn="base">
+              <a:spcBef>
+                <a:spcPct val="0"/>
+              </a:spcBef>
+              <a:spcAft>
+                <a:spcPct val="0"/>
+              </a:spcAft>
+              <a:defRPr kern="1200">
+                <a:solidFill>
+                  <a:schemeClr val="bg1"/>
+                </a:solidFill>
+                <a:latin typeface="Verdana" pitchFamily="34" charset="0"/>
+                <a:ea typeface="+mn-ea"/>
+                <a:cs typeface="+mn-cs"/>
+              </a:defRPr>
+            </a:lvl5pPr>
+            <a:lvl6pPr marL="2286000" algn="l" defTabSz="914400" rtl="0" eaLnBrk="1" latinLnBrk="0" hangingPunct="1">
+              <a:defRPr kern="1200">
+                <a:solidFill>
+                  <a:schemeClr val="bg1"/>
+                </a:solidFill>
+                <a:latin typeface="Verdana" pitchFamily="34" charset="0"/>
+                <a:ea typeface="+mn-ea"/>
+                <a:cs typeface="+mn-cs"/>
+              </a:defRPr>
+            </a:lvl6pPr>
+            <a:lvl7pPr marL="2743200" algn="l" defTabSz="914400" rtl="0" eaLnBrk="1" latinLnBrk="0" hangingPunct="1">
+              <a:defRPr kern="1200">
+                <a:solidFill>
+                  <a:schemeClr val="bg1"/>
+                </a:solidFill>
+                <a:latin typeface="Verdana" pitchFamily="34" charset="0"/>
+                <a:ea typeface="+mn-ea"/>
+                <a:cs typeface="+mn-cs"/>
+              </a:defRPr>
+            </a:lvl7pPr>
+            <a:lvl8pPr marL="3200400" algn="l" defTabSz="914400" rtl="0" eaLnBrk="1" latinLnBrk="0" hangingPunct="1">
+              <a:defRPr kern="1200">
+                <a:solidFill>
+                  <a:schemeClr val="bg1"/>
+                </a:solidFill>
+                <a:latin typeface="Verdana" pitchFamily="34" charset="0"/>
+                <a:ea typeface="+mn-ea"/>
+                <a:cs typeface="+mn-cs"/>
+              </a:defRPr>
+            </a:lvl8pPr>
+            <a:lvl9pPr marL="3657600" algn="l" defTabSz="914400" rtl="0" eaLnBrk="1" latinLnBrk="0" hangingPunct="1">
+              <a:defRPr kern="1200">
+                <a:solidFill>
+                  <a:schemeClr val="bg1"/>
+                </a:solidFill>
+                <a:latin typeface="Verdana" pitchFamily="34" charset="0"/>
+                <a:ea typeface="+mn-ea"/>
+                <a:cs typeface="+mn-cs"/>
+              </a:defRPr>
+            </a:lvl9pPr>
+          </a:lstStyle>
+          <a:p>
+            <a:fld id="{0C6113F6-D982-4F1F-82B4-AFA466AB9AFB}" type="slidenum">
+              <a:rPr lang="de-DE" smtClean="0"/>
+              <a:pPr/>
+              <a:t>17</a:t>
+            </a:fld>
+            <a:endParaRPr lang="de-DE"/>
+          </a:p>
+        </p:txBody>
+      </p:sp>
+      <p:sp>
+        <p:nvSpPr>
+          <p:cNvPr id="8" name="10-Point Star 7"/>
+          <p:cNvSpPr/>
+          <p:nvPr/>
+        </p:nvSpPr>
+        <p:spPr bwMode="auto">
+          <a:xfrm>
+            <a:off x="4950811" y="4204505"/>
+            <a:ext cx="822960" cy="822960"/>
+          </a:xfrm>
+          <a:prstGeom prst="star10">
+            <a:avLst/>
+          </a:prstGeom>
+          <a:solidFill>
+            <a:srgbClr val="008000"/>
+          </a:solidFill>
+          <a:ln w="9525" cap="flat" cmpd="sng" algn="ctr">
+            <a:solidFill>
+              <a:schemeClr val="tx1"/>
+            </a:solidFill>
+            <a:prstDash val="solid"/>
+            <a:round/>
+            <a:headEnd type="none" w="med" len="med"/>
+            <a:tailEnd type="none" w="med" len="med"/>
+          </a:ln>
+          <a:effectLst/>
+        </p:spPr>
+        <p:txBody>
+          <a:bodyPr/>
+          <a:lstStyle/>
+          <a:p>
+            <a:endParaRPr lang="en-US"/>
+          </a:p>
+        </p:txBody>
+      </p:sp>
+      <p:sp>
+        <p:nvSpPr>
+          <p:cNvPr id="9" name="10-Point Star 8"/>
+          <p:cNvSpPr/>
+          <p:nvPr/>
+        </p:nvSpPr>
+        <p:spPr bwMode="auto">
+          <a:xfrm>
+            <a:off x="1821801" y="4208995"/>
+            <a:ext cx="822960" cy="822960"/>
+          </a:xfrm>
+          <a:prstGeom prst="star10">
+            <a:avLst/>
+          </a:prstGeom>
+          <a:solidFill>
+            <a:srgbClr val="FF0000"/>
+          </a:solidFill>
+          <a:ln w="9525" cap="flat" cmpd="sng" algn="ctr">
+            <a:solidFill>
+              <a:schemeClr val="tx1"/>
+            </a:solidFill>
+            <a:prstDash val="solid"/>
+            <a:round/>
+            <a:headEnd type="none" w="med" len="med"/>
+            <a:tailEnd type="none" w="med" len="med"/>
+          </a:ln>
+          <a:effectLst/>
+        </p:spPr>
+        <p:txBody>
+          <a:bodyPr/>
+          <a:lstStyle/>
+          <a:p>
+            <a:endParaRPr lang="en-US"/>
+          </a:p>
+        </p:txBody>
+      </p:sp>
+      <p:sp>
+        <p:nvSpPr>
+          <p:cNvPr id="10" name="10-Point Star 9"/>
+          <p:cNvSpPr/>
+          <p:nvPr/>
+        </p:nvSpPr>
+        <p:spPr bwMode="auto">
+          <a:xfrm>
+            <a:off x="7153066" y="2918299"/>
+            <a:ext cx="822960" cy="822960"/>
+          </a:xfrm>
+          <a:prstGeom prst="star10">
+            <a:avLst/>
+          </a:prstGeom>
+          <a:solidFill>
+            <a:srgbClr val="3366FF"/>
+          </a:solidFill>
+          <a:ln w="9525" cap="flat" cmpd="sng" algn="ctr">
+            <a:solidFill>
+              <a:schemeClr val="tx1"/>
+            </a:solidFill>
+            <a:prstDash val="solid"/>
+            <a:round/>
+            <a:headEnd type="none" w="med" len="med"/>
+            <a:tailEnd type="none" w="med" len="med"/>
+          </a:ln>
+          <a:effectLst/>
+        </p:spPr>
+        <p:txBody>
+          <a:bodyPr/>
+          <a:lstStyle/>
+          <a:p>
+            <a:endParaRPr lang="en-US"/>
+          </a:p>
+        </p:txBody>
+      </p:sp>
+      <p:graphicFrame>
+        <p:nvGraphicFramePr>
+          <p:cNvPr id="11" name="Table 10"/>
+          <p:cNvGraphicFramePr>
+            <a:graphicFrameLocks noGrp="1"/>
+          </p:cNvGraphicFramePr>
+          <p:nvPr>
+            <p:extLst>
+              <p:ext uri="{D42A27DB-BD31-4B8C-83A1-F6EECF244321}">
+                <p14:modId xmlns:p14="http://schemas.microsoft.com/office/powerpoint/2010/main" val="1908535350"/>
+              </p:ext>
+            </p:extLst>
+          </p:nvPr>
+        </p:nvGraphicFramePr>
+        <p:xfrm>
+          <a:off x="3045153" y="3686731"/>
+          <a:ext cx="1401458" cy="1866065"/>
+        </p:xfrm>
+        <a:graphic>
+          <a:graphicData uri="http://schemas.openxmlformats.org/drawingml/2006/table">
+            <a:tbl>
+              <a:tblPr firstRow="1" bandRow="1">
+                <a:tableStyleId>{5C22544A-7EE6-4342-B048-85BDC9FD1C3A}</a:tableStyleId>
+              </a:tblPr>
+              <a:tblGrid>
+                <a:gridCol w="700729"/>
+                <a:gridCol w="700729"/>
+              </a:tblGrid>
+              <a:tr h="382375">
+                <a:tc>
+                  <a:txBody>
+                    <a:bodyPr/>
+                    <a:lstStyle/>
+                    <a:p>
+                      <a:pPr algn="ctr"/>
+                      <a:r>
+                        <a:rPr lang="en-US" dirty="0" smtClean="0"/>
+                        <a:t>A</a:t>
+                      </a:r>
+                      <a:endParaRPr lang="en-US" dirty="0"/>
+                    </a:p>
+                  </a:txBody>
+                  <a:tcPr/>
+                </a:tc>
+                <a:tc>
+                  <a:txBody>
+                    <a:bodyPr/>
+                    <a:lstStyle/>
+                    <a:p>
+                      <a:pPr algn="ctr"/>
+                      <a:r>
+                        <a:rPr lang="en-US" dirty="0" smtClean="0"/>
+                        <a:t>B</a:t>
+                      </a:r>
+                      <a:endParaRPr lang="en-US" dirty="0"/>
+                    </a:p>
+                  </a:txBody>
+                  <a:tcPr/>
+                </a:tc>
+              </a:tr>
+              <a:tr h="296738">
+                <a:tc>
+                  <a:txBody>
+                    <a:bodyPr/>
+                    <a:lstStyle/>
+                    <a:p>
+                      <a:pPr algn="ctr" fontAlgn="b"/>
+                      <a:r>
+                        <a:rPr lang="en-US" dirty="0" smtClean="0"/>
+                        <a:t>1</a:t>
+                      </a:r>
+                      <a:endParaRPr lang="en-US" dirty="0"/>
+                    </a:p>
+                  </a:txBody>
+                  <a:tcPr marL="9525" marR="9525" marT="9525" marB="0" anchor="b"/>
+                </a:tc>
+                <a:tc>
+                  <a:txBody>
+                    <a:bodyPr/>
+                    <a:lstStyle/>
+                    <a:p>
+                      <a:pPr algn="ctr" fontAlgn="b"/>
+                      <a:r>
+                        <a:rPr lang="en-US" dirty="0" smtClean="0"/>
+                        <a:t>2</a:t>
+                      </a:r>
+                      <a:endParaRPr lang="en-US" dirty="0"/>
+                    </a:p>
+                  </a:txBody>
+                  <a:tcPr marL="9525" marR="9525" marT="9525" marB="0" anchor="b"/>
+                </a:tc>
+              </a:tr>
+              <a:tr h="296738">
+                <a:tc>
+                  <a:txBody>
+                    <a:bodyPr/>
+                    <a:lstStyle/>
+                    <a:p>
+                      <a:pPr algn="ctr" fontAlgn="b"/>
+                      <a:r>
+                        <a:rPr lang="en-US" dirty="0" smtClean="0"/>
+                        <a:t>3</a:t>
+                      </a:r>
+                      <a:endParaRPr lang="en-US" dirty="0"/>
+                    </a:p>
+                  </a:txBody>
+                  <a:tcPr marL="9525" marR="9525" marT="9525" marB="0" anchor="b"/>
+                </a:tc>
+                <a:tc>
+                  <a:txBody>
+                    <a:bodyPr/>
+                    <a:lstStyle/>
+                    <a:p>
+                      <a:pPr algn="ctr" fontAlgn="b"/>
+                      <a:r>
+                        <a:rPr lang="en-US" dirty="0" smtClean="0"/>
+                        <a:t>5</a:t>
+                      </a:r>
+                      <a:endParaRPr lang="en-US" dirty="0"/>
+                    </a:p>
+                  </a:txBody>
+                  <a:tcPr marL="9525" marR="9525" marT="9525" marB="0" anchor="b"/>
+                </a:tc>
+              </a:tr>
+              <a:tr h="296738">
+                <a:tc>
+                  <a:txBody>
+                    <a:bodyPr/>
+                    <a:lstStyle/>
+                    <a:p>
+                      <a:pPr algn="ctr" fontAlgn="b"/>
+                      <a:r>
+                        <a:rPr lang="en-US" dirty="0" smtClean="0"/>
+                        <a:t>4</a:t>
+                      </a:r>
+                      <a:endParaRPr lang="en-US" dirty="0"/>
+                    </a:p>
+                  </a:txBody>
+                  <a:tcPr marL="9525" marR="9525" marT="9525" marB="0" anchor="b"/>
+                </a:tc>
+                <a:tc>
+                  <a:txBody>
+                    <a:bodyPr/>
+                    <a:lstStyle/>
+                    <a:p>
+                      <a:pPr algn="ctr" fontAlgn="b"/>
+                      <a:r>
+                        <a:rPr lang="en-US" dirty="0" smtClean="0"/>
+                        <a:t>8</a:t>
+                      </a:r>
+                      <a:endParaRPr lang="en-US" dirty="0"/>
+                    </a:p>
+                  </a:txBody>
+                  <a:tcPr marL="9525" marR="9525" marT="9525" marB="0" anchor="b"/>
+                </a:tc>
+              </a:tr>
+              <a:tr h="296738">
+                <a:tc>
+                  <a:txBody>
+                    <a:bodyPr/>
+                    <a:lstStyle/>
+                    <a:p>
+                      <a:pPr algn="ctr" fontAlgn="b"/>
+                      <a:r>
+                        <a:rPr lang="en-US" dirty="0" smtClean="0"/>
+                        <a:t>6 </a:t>
+                      </a:r>
+                      <a:endParaRPr lang="en-US" dirty="0"/>
+                    </a:p>
+                  </a:txBody>
+                  <a:tcPr marL="9525" marR="9525" marT="9525" marB="0" anchor="b"/>
+                </a:tc>
+                <a:tc>
+                  <a:txBody>
+                    <a:bodyPr/>
+                    <a:lstStyle/>
+                    <a:p>
+                      <a:pPr algn="ctr" fontAlgn="b"/>
+                      <a:endParaRPr lang="en-US" dirty="0"/>
+                    </a:p>
+                  </a:txBody>
+                  <a:tcPr marL="9525" marR="9525" marT="9525" marB="0" anchor="b"/>
+                </a:tc>
+              </a:tr>
+              <a:tr h="296738">
+                <a:tc>
+                  <a:txBody>
+                    <a:bodyPr/>
+                    <a:lstStyle/>
+                    <a:p>
+                      <a:pPr algn="ctr" fontAlgn="b"/>
+                      <a:r>
+                        <a:rPr lang="en-US" dirty="0" smtClean="0"/>
+                        <a:t>7</a:t>
+                      </a:r>
+                      <a:endParaRPr lang="en-US" dirty="0"/>
+                    </a:p>
+                  </a:txBody>
+                  <a:tcPr marL="9525" marR="9525" marT="9525" marB="0" anchor="b"/>
+                </a:tc>
+                <a:tc>
+                  <a:txBody>
+                    <a:bodyPr/>
+                    <a:lstStyle/>
+                    <a:p>
+                      <a:pPr algn="ctr" fontAlgn="b"/>
+                      <a:endParaRPr lang="en-US" dirty="0"/>
+                    </a:p>
+                  </a:txBody>
+                  <a:tcPr marL="9525" marR="9525" marT="9525" marB="0" anchor="b"/>
+                </a:tc>
+              </a:tr>
+            </a:tbl>
+          </a:graphicData>
+        </a:graphic>
+      </p:graphicFrame>
+      <p:sp>
+        <p:nvSpPr>
+          <p:cNvPr id="12" name="Multidocument 11"/>
+          <p:cNvSpPr/>
+          <p:nvPr/>
+        </p:nvSpPr>
+        <p:spPr bwMode="auto">
+          <a:xfrm>
+            <a:off x="571708" y="4203760"/>
+            <a:ext cx="822960" cy="822960"/>
+          </a:xfrm>
+          <a:prstGeom prst="flowChartMultidocument">
+            <a:avLst/>
+          </a:prstGeom>
+          <a:solidFill>
+            <a:schemeClr val="accent1"/>
+          </a:solidFill>
+          <a:ln w="9525" cap="flat" cmpd="sng" algn="ctr">
+            <a:solidFill>
+              <a:schemeClr val="tx1"/>
+            </a:solidFill>
+            <a:prstDash val="solid"/>
+            <a:round/>
+            <a:headEnd type="none" w="med" len="med"/>
+            <a:tailEnd type="none" w="med" len="med"/>
+          </a:ln>
+          <a:effectLst/>
+        </p:spPr>
+        <p:txBody>
+          <a:bodyPr/>
+          <a:lstStyle/>
+          <a:p>
+            <a:endParaRPr lang="en-US"/>
+          </a:p>
+        </p:txBody>
+      </p:sp>
+      <p:sp>
+        <p:nvSpPr>
+          <p:cNvPr id="13" name="10-Point Star 12"/>
+          <p:cNvSpPr/>
+          <p:nvPr/>
+        </p:nvSpPr>
+        <p:spPr bwMode="auto">
+          <a:xfrm>
+            <a:off x="7155257" y="5487561"/>
+            <a:ext cx="822960" cy="822960"/>
+          </a:xfrm>
+          <a:prstGeom prst="star10">
+            <a:avLst/>
+          </a:prstGeom>
+          <a:solidFill>
+            <a:srgbClr val="3366FF"/>
+          </a:solidFill>
+          <a:ln w="9525" cap="flat" cmpd="sng" algn="ctr">
+            <a:solidFill>
+              <a:schemeClr val="tx1"/>
+            </a:solidFill>
+            <a:prstDash val="solid"/>
+            <a:round/>
+            <a:headEnd type="none" w="med" len="med"/>
+            <a:tailEnd type="none" w="med" len="med"/>
+          </a:ln>
+          <a:effectLst/>
+        </p:spPr>
+        <p:txBody>
+          <a:bodyPr/>
+          <a:lstStyle/>
+          <a:p>
+            <a:endParaRPr lang="en-US"/>
+          </a:p>
+        </p:txBody>
+      </p:sp>
+      <p:sp>
+        <p:nvSpPr>
+          <p:cNvPr id="14" name="10-Point Star 13"/>
+          <p:cNvSpPr/>
+          <p:nvPr/>
+        </p:nvSpPr>
+        <p:spPr bwMode="auto">
+          <a:xfrm>
+            <a:off x="7157447" y="4206233"/>
+            <a:ext cx="822960" cy="822960"/>
+          </a:xfrm>
+          <a:prstGeom prst="star10">
+            <a:avLst/>
+          </a:prstGeom>
+          <a:solidFill>
+            <a:srgbClr val="3366FF"/>
+          </a:solidFill>
+          <a:ln w="9525" cap="flat" cmpd="sng" algn="ctr">
+            <a:solidFill>
+              <a:schemeClr val="tx1"/>
+            </a:solidFill>
+            <a:prstDash val="solid"/>
+            <a:round/>
+            <a:headEnd type="none" w="med" len="med"/>
+            <a:tailEnd type="none" w="med" len="med"/>
+          </a:ln>
+          <a:effectLst/>
+        </p:spPr>
+        <p:txBody>
+          <a:bodyPr/>
+          <a:lstStyle/>
+          <a:p>
+            <a:endParaRPr lang="en-US"/>
+          </a:p>
+        </p:txBody>
+      </p:sp>
+      <p:cxnSp>
+        <p:nvCxnSpPr>
+          <p:cNvPr id="15" name="Straight Connector 14"/>
+          <p:cNvCxnSpPr/>
+          <p:nvPr/>
+        </p:nvCxnSpPr>
+        <p:spPr bwMode="auto">
+          <a:xfrm>
+            <a:off x="1196355" y="4620208"/>
+            <a:ext cx="702489" cy="628"/>
+          </a:xfrm>
+          <a:prstGeom prst="line">
+            <a:avLst/>
+          </a:prstGeom>
+          <a:ln>
+            <a:headEnd type="none" w="med" len="med"/>
+            <a:tailEnd type="triangle" w="lg"/>
+          </a:ln>
+        </p:spPr>
+        <p:style>
+          <a:lnRef idx="3">
+            <a:schemeClr val="dk1"/>
+          </a:lnRef>
+          <a:fillRef idx="0">
+            <a:schemeClr val="dk1"/>
+          </a:fillRef>
+          <a:effectRef idx="2">
+            <a:schemeClr val="dk1"/>
+          </a:effectRef>
+          <a:fontRef idx="minor">
+            <a:schemeClr val="tx1"/>
+          </a:fontRef>
+        </p:style>
+      </p:cxnSp>
+      <p:cxnSp>
+        <p:nvCxnSpPr>
+          <p:cNvPr id="16" name="Straight Connector 15"/>
+          <p:cNvCxnSpPr>
+            <a:endCxn id="11" idx="1"/>
+          </p:cNvCxnSpPr>
+          <p:nvPr/>
+        </p:nvCxnSpPr>
+        <p:spPr bwMode="auto">
+          <a:xfrm>
+            <a:off x="2539905" y="4615239"/>
+            <a:ext cx="505248" cy="4524"/>
+          </a:xfrm>
+          <a:prstGeom prst="line">
+            <a:avLst/>
+          </a:prstGeom>
+          <a:ln>
+            <a:headEnd type="none" w="med" len="med"/>
+            <a:tailEnd type="triangle" w="lg"/>
+          </a:ln>
+        </p:spPr>
+        <p:style>
+          <a:lnRef idx="3">
+            <a:schemeClr val="dk1"/>
+          </a:lnRef>
+          <a:fillRef idx="0">
+            <a:schemeClr val="dk1"/>
+          </a:fillRef>
+          <a:effectRef idx="2">
+            <a:schemeClr val="dk1"/>
+          </a:effectRef>
+          <a:fontRef idx="minor">
+            <a:schemeClr val="tx1"/>
+          </a:fontRef>
+        </p:style>
+      </p:cxnSp>
+      <p:cxnSp>
+        <p:nvCxnSpPr>
+          <p:cNvPr id="17" name="Straight Connector 16"/>
+          <p:cNvCxnSpPr>
+            <a:stCxn id="11" idx="0"/>
+          </p:cNvCxnSpPr>
+          <p:nvPr/>
+        </p:nvCxnSpPr>
+        <p:spPr bwMode="auto">
+          <a:xfrm flipH="1" flipV="1">
+            <a:off x="3721098" y="2512439"/>
+            <a:ext cx="24784" cy="1174292"/>
+          </a:xfrm>
+          <a:prstGeom prst="line">
+            <a:avLst/>
+          </a:prstGeom>
+          <a:ln>
+            <a:headEnd type="none" w="med" len="med"/>
+            <a:tailEnd type="triangle" w="lg"/>
+          </a:ln>
+        </p:spPr>
+        <p:style>
+          <a:lnRef idx="3">
+            <a:schemeClr val="dk1"/>
+          </a:lnRef>
+          <a:fillRef idx="0">
+            <a:schemeClr val="dk1"/>
+          </a:fillRef>
+          <a:effectRef idx="2">
+            <a:schemeClr val="dk1"/>
+          </a:effectRef>
+          <a:fontRef idx="minor">
+            <a:schemeClr val="tx1"/>
+          </a:fontRef>
+        </p:style>
+      </p:cxnSp>
+      <p:cxnSp>
+        <p:nvCxnSpPr>
+          <p:cNvPr id="18" name="Straight Connector 17"/>
+          <p:cNvCxnSpPr/>
+          <p:nvPr/>
+        </p:nvCxnSpPr>
+        <p:spPr bwMode="auto">
+          <a:xfrm>
+            <a:off x="3952903" y="2446366"/>
+            <a:ext cx="20819" cy="1281327"/>
+          </a:xfrm>
+          <a:prstGeom prst="line">
+            <a:avLst/>
+          </a:prstGeom>
+          <a:ln>
+            <a:headEnd type="none" w="med" len="med"/>
+            <a:tailEnd type="triangle" w="lg"/>
+          </a:ln>
+        </p:spPr>
+        <p:style>
+          <a:lnRef idx="3">
+            <a:schemeClr val="dk1"/>
+          </a:lnRef>
+          <a:fillRef idx="0">
+            <a:schemeClr val="dk1"/>
+          </a:fillRef>
+          <a:effectRef idx="2">
+            <a:schemeClr val="dk1"/>
+          </a:effectRef>
+          <a:fontRef idx="minor">
+            <a:schemeClr val="tx1"/>
+          </a:fontRef>
+        </p:style>
+      </p:cxnSp>
     </p:spTree>
     <p:extLst>
       <p:ext uri="{BB962C8B-B14F-4D97-AF65-F5344CB8AC3E}">
@@ -11140,7 +12043,7 @@
             </a:pPr>
             <a:r>
               <a:rPr lang="en-US" dirty="0" smtClean="0"/>
-              <a:t>Read + Preprocess: 3min15sec</a:t>
+              <a:t>Part 1: Read from file + Preprocess: 3min15sec</a:t>
             </a:r>
             <a:endParaRPr lang="en-US" dirty="0"/>
           </a:p>
@@ -11151,7 +12054,7 @@
             </a:pPr>
             <a:r>
               <a:rPr lang="en-US" dirty="0" smtClean="0"/>
-              <a:t>Core Processing: 1min</a:t>
+              <a:t>Part 2: INDs Core Processing: 1min</a:t>
             </a:r>
           </a:p>
           <a:p>
@@ -11172,7 +12075,7 @@
             </a:pPr>
             <a:r>
               <a:rPr lang="en-US" dirty="0" smtClean="0"/>
-              <a:t>No, we could do better by preprocessing and finding computing INDs in parallel</a:t>
+              <a:t>No, we did better by doing part 1 and 2 in parallel</a:t>
             </a:r>
           </a:p>
           <a:p>
@@ -11250,7 +12153,7 @@
         </p:nvSpPr>
         <p:spPr bwMode="auto">
           <a:xfrm>
-            <a:off x="694617" y="4763592"/>
+            <a:off x="694617" y="4422217"/>
             <a:ext cx="822960" cy="822960"/>
           </a:xfrm>
           <a:prstGeom prst="mathPlus">
@@ -11286,7 +12189,7 @@
         </p:nvSpPr>
         <p:spPr bwMode="auto">
           <a:xfrm>
-            <a:off x="694608" y="5734638"/>
+            <a:off x="694608" y="5393263"/>
             <a:ext cx="822960" cy="822960"/>
           </a:xfrm>
           <a:prstGeom prst="mathMinus">
@@ -11322,7 +12225,7 @@
         </p:nvSpPr>
         <p:spPr>
           <a:xfrm>
-            <a:off x="1603230" y="4709256"/>
+            <a:off x="1603230" y="4367881"/>
             <a:ext cx="4572000" cy="1754327"/>
           </a:xfrm>
           <a:prstGeom prst="rect">
@@ -11495,25 +12398,6 @@
       </p:sp>
       <p:sp>
         <p:nvSpPr>
-          <p:cNvPr id="3" name="Content Placeholder 2"/>
-          <p:cNvSpPr>
-            <a:spLocks noGrp="1"/>
-          </p:cNvSpPr>
-          <p:nvPr>
-            <p:ph idx="1"/>
-          </p:nvPr>
-        </p:nvSpPr>
-        <p:spPr/>
-        <p:txBody>
-          <a:bodyPr/>
-          <a:lstStyle/>
-          <a:p>
-            <a:endParaRPr lang="en-US" dirty="0"/>
-          </a:p>
-        </p:txBody>
-      </p:sp>
-      <p:sp>
-        <p:nvSpPr>
           <p:cNvPr id="4" name="Footer Placeholder 3"/>
           <p:cNvSpPr>
             <a:spLocks noGrp="1"/>
@@ -11567,7 +12451,7 @@
         </p:nvSpPr>
         <p:spPr bwMode="auto">
           <a:xfrm>
-            <a:off x="4240730" y="2743467"/>
+            <a:off x="4950811" y="4204505"/>
             <a:ext cx="822960" cy="822960"/>
           </a:xfrm>
           <a:prstGeom prst="star10">
@@ -11603,7 +12487,7 @@
         </p:nvSpPr>
         <p:spPr bwMode="auto">
           <a:xfrm>
-            <a:off x="2040288" y="2788921"/>
+            <a:off x="1821801" y="4208995"/>
             <a:ext cx="822960" cy="822960"/>
           </a:xfrm>
           <a:prstGeom prst="star10">
@@ -11639,7 +12523,7 @@
         </p:nvSpPr>
         <p:spPr bwMode="auto">
           <a:xfrm>
-            <a:off x="6483951" y="2740796"/>
+            <a:off x="7153066" y="2918299"/>
             <a:ext cx="822960" cy="822960"/>
           </a:xfrm>
           <a:prstGeom prst="star10">
@@ -11667,6 +12551,512 @@
           </a:p>
         </p:txBody>
       </p:sp>
+      <p:graphicFrame>
+        <p:nvGraphicFramePr>
+          <p:cNvPr id="11" name="Table 10"/>
+          <p:cNvGraphicFramePr>
+            <a:graphicFrameLocks noGrp="1"/>
+          </p:cNvGraphicFramePr>
+          <p:nvPr>
+            <p:extLst>
+              <p:ext uri="{D42A27DB-BD31-4B8C-83A1-F6EECF244321}">
+                <p14:modId xmlns:p14="http://schemas.microsoft.com/office/powerpoint/2010/main" val="3673987302"/>
+              </p:ext>
+            </p:extLst>
+          </p:nvPr>
+        </p:nvGraphicFramePr>
+        <p:xfrm>
+          <a:off x="3045153" y="3686731"/>
+          <a:ext cx="1401458" cy="1866065"/>
+        </p:xfrm>
+        <a:graphic>
+          <a:graphicData uri="http://schemas.openxmlformats.org/drawingml/2006/table">
+            <a:tbl>
+              <a:tblPr firstRow="1" bandRow="1">
+                <a:tableStyleId>{5C22544A-7EE6-4342-B048-85BDC9FD1C3A}</a:tableStyleId>
+              </a:tblPr>
+              <a:tblGrid>
+                <a:gridCol w="700729"/>
+                <a:gridCol w="700729"/>
+              </a:tblGrid>
+              <a:tr h="382375">
+                <a:tc>
+                  <a:txBody>
+                    <a:bodyPr/>
+                    <a:lstStyle/>
+                    <a:p>
+                      <a:pPr algn="ctr"/>
+                      <a:r>
+                        <a:rPr lang="en-US" dirty="0" smtClean="0"/>
+                        <a:t>A</a:t>
+                      </a:r>
+                      <a:endParaRPr lang="en-US" dirty="0"/>
+                    </a:p>
+                  </a:txBody>
+                  <a:tcPr/>
+                </a:tc>
+                <a:tc>
+                  <a:txBody>
+                    <a:bodyPr/>
+                    <a:lstStyle/>
+                    <a:p>
+                      <a:pPr algn="ctr"/>
+                      <a:r>
+                        <a:rPr lang="en-US" dirty="0" smtClean="0"/>
+                        <a:t>B</a:t>
+                      </a:r>
+                      <a:endParaRPr lang="en-US" dirty="0"/>
+                    </a:p>
+                  </a:txBody>
+                  <a:tcPr/>
+                </a:tc>
+              </a:tr>
+              <a:tr h="296738">
+                <a:tc>
+                  <a:txBody>
+                    <a:bodyPr/>
+                    <a:lstStyle/>
+                    <a:p>
+                      <a:pPr algn="ctr" fontAlgn="b"/>
+                      <a:r>
+                        <a:rPr lang="en-US" dirty="0" smtClean="0"/>
+                        <a:t>1</a:t>
+                      </a:r>
+                      <a:endParaRPr lang="en-US" dirty="0"/>
+                    </a:p>
+                  </a:txBody>
+                  <a:tcPr marL="9525" marR="9525" marT="9525" marB="0" anchor="b"/>
+                </a:tc>
+                <a:tc>
+                  <a:txBody>
+                    <a:bodyPr/>
+                    <a:lstStyle/>
+                    <a:p>
+                      <a:pPr algn="ctr" fontAlgn="b"/>
+                      <a:r>
+                        <a:rPr lang="en-US" dirty="0" smtClean="0"/>
+                        <a:t>2</a:t>
+                      </a:r>
+                      <a:endParaRPr lang="en-US" dirty="0"/>
+                    </a:p>
+                  </a:txBody>
+                  <a:tcPr marL="9525" marR="9525" marT="9525" marB="0" anchor="b"/>
+                </a:tc>
+              </a:tr>
+              <a:tr h="296738">
+                <a:tc>
+                  <a:txBody>
+                    <a:bodyPr/>
+                    <a:lstStyle/>
+                    <a:p>
+                      <a:pPr algn="ctr" fontAlgn="b"/>
+                      <a:r>
+                        <a:rPr lang="en-US" dirty="0" smtClean="0"/>
+                        <a:t>3</a:t>
+                      </a:r>
+                      <a:endParaRPr lang="en-US" dirty="0"/>
+                    </a:p>
+                  </a:txBody>
+                  <a:tcPr marL="9525" marR="9525" marT="9525" marB="0" anchor="b"/>
+                </a:tc>
+                <a:tc>
+                  <a:txBody>
+                    <a:bodyPr/>
+                    <a:lstStyle/>
+                    <a:p>
+                      <a:pPr algn="ctr" fontAlgn="b"/>
+                      <a:r>
+                        <a:rPr lang="en-US" dirty="0" smtClean="0"/>
+                        <a:t>5</a:t>
+                      </a:r>
+                      <a:endParaRPr lang="en-US" dirty="0"/>
+                    </a:p>
+                  </a:txBody>
+                  <a:tcPr marL="9525" marR="9525" marT="9525" marB="0" anchor="b"/>
+                </a:tc>
+              </a:tr>
+              <a:tr h="296738">
+                <a:tc>
+                  <a:txBody>
+                    <a:bodyPr/>
+                    <a:lstStyle/>
+                    <a:p>
+                      <a:pPr algn="ctr" fontAlgn="b"/>
+                      <a:r>
+                        <a:rPr lang="en-US" dirty="0" smtClean="0"/>
+                        <a:t>4</a:t>
+                      </a:r>
+                      <a:endParaRPr lang="en-US" dirty="0"/>
+                    </a:p>
+                  </a:txBody>
+                  <a:tcPr marL="9525" marR="9525" marT="9525" marB="0" anchor="b"/>
+                </a:tc>
+                <a:tc>
+                  <a:txBody>
+                    <a:bodyPr/>
+                    <a:lstStyle/>
+                    <a:p>
+                      <a:pPr algn="ctr" fontAlgn="b"/>
+                      <a:r>
+                        <a:rPr lang="en-US" dirty="0" smtClean="0"/>
+                        <a:t>8</a:t>
+                      </a:r>
+                      <a:endParaRPr lang="en-US" dirty="0"/>
+                    </a:p>
+                  </a:txBody>
+                  <a:tcPr marL="9525" marR="9525" marT="9525" marB="0" anchor="b"/>
+                </a:tc>
+              </a:tr>
+              <a:tr h="296738">
+                <a:tc>
+                  <a:txBody>
+                    <a:bodyPr/>
+                    <a:lstStyle/>
+                    <a:p>
+                      <a:pPr algn="ctr" fontAlgn="b"/>
+                      <a:r>
+                        <a:rPr lang="en-US" dirty="0" smtClean="0"/>
+                        <a:t>6 </a:t>
+                      </a:r>
+                      <a:endParaRPr lang="en-US" dirty="0"/>
+                    </a:p>
+                  </a:txBody>
+                  <a:tcPr marL="9525" marR="9525" marT="9525" marB="0" anchor="b"/>
+                </a:tc>
+                <a:tc>
+                  <a:txBody>
+                    <a:bodyPr/>
+                    <a:lstStyle/>
+                    <a:p>
+                      <a:pPr algn="ctr" fontAlgn="b"/>
+                      <a:endParaRPr lang="en-US" dirty="0"/>
+                    </a:p>
+                  </a:txBody>
+                  <a:tcPr marL="9525" marR="9525" marT="9525" marB="0" anchor="b"/>
+                </a:tc>
+              </a:tr>
+              <a:tr h="296738">
+                <a:tc>
+                  <a:txBody>
+                    <a:bodyPr/>
+                    <a:lstStyle/>
+                    <a:p>
+                      <a:pPr algn="ctr" fontAlgn="b"/>
+                      <a:r>
+                        <a:rPr lang="en-US" dirty="0" smtClean="0"/>
+                        <a:t>7</a:t>
+                      </a:r>
+                      <a:endParaRPr lang="en-US" dirty="0"/>
+                    </a:p>
+                  </a:txBody>
+                  <a:tcPr marL="9525" marR="9525" marT="9525" marB="0" anchor="b"/>
+                </a:tc>
+                <a:tc>
+                  <a:txBody>
+                    <a:bodyPr/>
+                    <a:lstStyle/>
+                    <a:p>
+                      <a:pPr algn="ctr" fontAlgn="b"/>
+                      <a:endParaRPr lang="en-US" dirty="0"/>
+                    </a:p>
+                  </a:txBody>
+                  <a:tcPr marL="9525" marR="9525" marT="9525" marB="0" anchor="b"/>
+                </a:tc>
+              </a:tr>
+            </a:tbl>
+          </a:graphicData>
+        </a:graphic>
+      </p:graphicFrame>
+      <p:sp>
+        <p:nvSpPr>
+          <p:cNvPr id="12" name="Multidocument 11"/>
+          <p:cNvSpPr/>
+          <p:nvPr/>
+        </p:nvSpPr>
+        <p:spPr bwMode="auto">
+          <a:xfrm>
+            <a:off x="571708" y="4203760"/>
+            <a:ext cx="822960" cy="822960"/>
+          </a:xfrm>
+          <a:prstGeom prst="flowChartMultidocument">
+            <a:avLst/>
+          </a:prstGeom>
+          <a:solidFill>
+            <a:schemeClr val="accent1"/>
+          </a:solidFill>
+          <a:ln w="9525" cap="flat" cmpd="sng" algn="ctr">
+            <a:solidFill>
+              <a:schemeClr val="tx1"/>
+            </a:solidFill>
+            <a:prstDash val="solid"/>
+            <a:round/>
+            <a:headEnd type="none" w="med" len="med"/>
+            <a:tailEnd type="none" w="med" len="med"/>
+          </a:ln>
+          <a:effectLst/>
+        </p:spPr>
+        <p:txBody>
+          <a:bodyPr/>
+          <a:lstStyle/>
+          <a:p>
+            <a:endParaRPr lang="en-US"/>
+          </a:p>
+        </p:txBody>
+      </p:sp>
+      <p:pic>
+        <p:nvPicPr>
+          <p:cNvPr id="15" name="Picture 14" descr="book-icon-hi.jpg"/>
+          <p:cNvPicPr>
+            <a:picLocks noChangeAspect="1"/>
+          </p:cNvPicPr>
+          <p:nvPr/>
+        </p:nvPicPr>
+        <p:blipFill rotWithShape="1">
+          <a:blip r:embed="rId2">
+            <a:extLst>
+              <a:ext uri="{BEBA8EAE-BF5A-486C-A8C5-ECC9F3942E4B}">
+                <a14:imgProps xmlns:a14="http://schemas.microsoft.com/office/drawing/2010/main">
+                  <a14:imgLayer r:embed="rId3">
+                    <a14:imgEffect>
+                      <a14:backgroundRemoval t="10000" b="90000" l="3917" r="95667">
+                        <a14:foregroundMark x1="25250" y1="18417" x2="25250" y2="18417"/>
+                        <a14:foregroundMark x1="82250" y1="72083" x2="82250" y2="72083"/>
+                      </a14:backgroundRemoval>
+                    </a14:imgEffect>
+                  </a14:imgLayer>
+                </a14:imgProps>
+              </a:ext>
+              <a:ext uri="{28A0092B-C50C-407E-A947-70E740481C1C}">
+                <a14:useLocalDpi xmlns:a14="http://schemas.microsoft.com/office/drawing/2010/main" val="0"/>
+              </a:ext>
+            </a:extLst>
+          </a:blip>
+          <a:srcRect l="2760" t="10870" r="2752" b="18895"/>
+          <a:stretch/>
+        </p:blipFill>
+        <p:spPr>
+          <a:xfrm>
+            <a:off x="2949567" y="1365457"/>
+            <a:ext cx="1543061" cy="1146982"/>
+          </a:xfrm>
+          <a:prstGeom prst="rect">
+            <a:avLst/>
+          </a:prstGeom>
+        </p:spPr>
+      </p:pic>
+      <p:sp>
+        <p:nvSpPr>
+          <p:cNvPr id="17" name="10-Point Star 16"/>
+          <p:cNvSpPr/>
+          <p:nvPr/>
+        </p:nvSpPr>
+        <p:spPr bwMode="auto">
+          <a:xfrm>
+            <a:off x="7155257" y="5487561"/>
+            <a:ext cx="822960" cy="822960"/>
+          </a:xfrm>
+          <a:prstGeom prst="star10">
+            <a:avLst/>
+          </a:prstGeom>
+          <a:solidFill>
+            <a:srgbClr val="3366FF"/>
+          </a:solidFill>
+          <a:ln w="9525" cap="flat" cmpd="sng" algn="ctr">
+            <a:solidFill>
+              <a:schemeClr val="tx1"/>
+            </a:solidFill>
+            <a:prstDash val="solid"/>
+            <a:round/>
+            <a:headEnd type="none" w="med" len="med"/>
+            <a:tailEnd type="none" w="med" len="med"/>
+          </a:ln>
+          <a:effectLst/>
+        </p:spPr>
+        <p:txBody>
+          <a:bodyPr/>
+          <a:lstStyle/>
+          <a:p>
+            <a:endParaRPr lang="en-US"/>
+          </a:p>
+        </p:txBody>
+      </p:sp>
+      <p:sp>
+        <p:nvSpPr>
+          <p:cNvPr id="18" name="10-Point Star 17"/>
+          <p:cNvSpPr/>
+          <p:nvPr/>
+        </p:nvSpPr>
+        <p:spPr bwMode="auto">
+          <a:xfrm>
+            <a:off x="7157447" y="4206233"/>
+            <a:ext cx="822960" cy="822960"/>
+          </a:xfrm>
+          <a:prstGeom prst="star10">
+            <a:avLst/>
+          </a:prstGeom>
+          <a:solidFill>
+            <a:srgbClr val="3366FF"/>
+          </a:solidFill>
+          <a:ln w="9525" cap="flat" cmpd="sng" algn="ctr">
+            <a:solidFill>
+              <a:schemeClr val="tx1"/>
+            </a:solidFill>
+            <a:prstDash val="solid"/>
+            <a:round/>
+            <a:headEnd type="none" w="med" len="med"/>
+            <a:tailEnd type="none" w="med" len="med"/>
+          </a:ln>
+          <a:effectLst/>
+        </p:spPr>
+        <p:txBody>
+          <a:bodyPr/>
+          <a:lstStyle/>
+          <a:p>
+            <a:endParaRPr lang="en-US"/>
+          </a:p>
+        </p:txBody>
+      </p:sp>
+      <p:cxnSp>
+        <p:nvCxnSpPr>
+          <p:cNvPr id="19" name="Straight Connector 18"/>
+          <p:cNvCxnSpPr/>
+          <p:nvPr/>
+        </p:nvCxnSpPr>
+        <p:spPr bwMode="auto">
+          <a:xfrm>
+            <a:off x="1196355" y="4620208"/>
+            <a:ext cx="702489" cy="628"/>
+          </a:xfrm>
+          <a:prstGeom prst="line">
+            <a:avLst/>
+          </a:prstGeom>
+          <a:ln>
+            <a:headEnd type="none" w="med" len="med"/>
+            <a:tailEnd type="triangle" w="lg"/>
+          </a:ln>
+        </p:spPr>
+        <p:style>
+          <a:lnRef idx="3">
+            <a:schemeClr val="dk1"/>
+          </a:lnRef>
+          <a:fillRef idx="0">
+            <a:schemeClr val="dk1"/>
+          </a:fillRef>
+          <a:effectRef idx="2">
+            <a:schemeClr val="dk1"/>
+          </a:effectRef>
+          <a:fontRef idx="minor">
+            <a:schemeClr val="tx1"/>
+          </a:fontRef>
+        </p:style>
+      </p:cxnSp>
+      <p:cxnSp>
+        <p:nvCxnSpPr>
+          <p:cNvPr id="20" name="Straight Connector 19"/>
+          <p:cNvCxnSpPr>
+            <a:endCxn id="11" idx="1"/>
+          </p:cNvCxnSpPr>
+          <p:nvPr/>
+        </p:nvCxnSpPr>
+        <p:spPr bwMode="auto">
+          <a:xfrm>
+            <a:off x="2539905" y="4615239"/>
+            <a:ext cx="505248" cy="4524"/>
+          </a:xfrm>
+          <a:prstGeom prst="line">
+            <a:avLst/>
+          </a:prstGeom>
+          <a:ln>
+            <a:headEnd type="none" w="med" len="med"/>
+            <a:tailEnd type="triangle" w="lg"/>
+          </a:ln>
+        </p:spPr>
+        <p:style>
+          <a:lnRef idx="3">
+            <a:schemeClr val="dk1"/>
+          </a:lnRef>
+          <a:fillRef idx="0">
+            <a:schemeClr val="dk1"/>
+          </a:fillRef>
+          <a:effectRef idx="2">
+            <a:schemeClr val="dk1"/>
+          </a:effectRef>
+          <a:fontRef idx="minor">
+            <a:schemeClr val="tx1"/>
+          </a:fontRef>
+        </p:style>
+      </p:cxnSp>
+      <p:cxnSp>
+        <p:nvCxnSpPr>
+          <p:cNvPr id="23" name="Straight Connector 22"/>
+          <p:cNvCxnSpPr>
+            <a:stCxn id="11" idx="0"/>
+            <a:endCxn id="15" idx="2"/>
+          </p:cNvCxnSpPr>
+          <p:nvPr/>
+        </p:nvCxnSpPr>
+        <p:spPr bwMode="auto">
+          <a:xfrm flipH="1" flipV="1">
+            <a:off x="3721098" y="2512439"/>
+            <a:ext cx="24784" cy="1174292"/>
+          </a:xfrm>
+          <a:prstGeom prst="line">
+            <a:avLst/>
+          </a:prstGeom>
+          <a:ln>
+            <a:headEnd type="none" w="med" len="med"/>
+            <a:tailEnd type="triangle" w="lg"/>
+          </a:ln>
+        </p:spPr>
+        <p:style>
+          <a:lnRef idx="3">
+            <a:schemeClr val="dk1"/>
+          </a:lnRef>
+          <a:fillRef idx="0">
+            <a:schemeClr val="dk1"/>
+          </a:fillRef>
+          <a:effectRef idx="2">
+            <a:schemeClr val="dk1"/>
+          </a:effectRef>
+          <a:fontRef idx="minor">
+            <a:schemeClr val="tx1"/>
+          </a:fontRef>
+        </p:style>
+      </p:cxnSp>
+      <p:cxnSp>
+        <p:nvCxnSpPr>
+          <p:cNvPr id="26" name="Straight Connector 25"/>
+          <p:cNvCxnSpPr/>
+          <p:nvPr/>
+        </p:nvCxnSpPr>
+        <p:spPr bwMode="auto">
+          <a:xfrm>
+            <a:off x="3952903" y="2446366"/>
+            <a:ext cx="20819" cy="1281327"/>
+          </a:xfrm>
+          <a:prstGeom prst="line">
+            <a:avLst/>
+          </a:prstGeom>
+          <a:ln>
+            <a:headEnd type="none" w="med" len="med"/>
+            <a:tailEnd type="triangle" w="lg"/>
+          </a:ln>
+        </p:spPr>
+        <p:style>
+          <a:lnRef idx="3">
+            <a:schemeClr val="dk1"/>
+          </a:lnRef>
+          <a:fillRef idx="0">
+            <a:schemeClr val="dk1"/>
+          </a:fillRef>
+          <a:effectRef idx="2">
+            <a:schemeClr val="dk1"/>
+          </a:effectRef>
+          <a:fontRef idx="minor">
+            <a:schemeClr val="tx1"/>
+          </a:fontRef>
+        </p:style>
+      </p:cxnSp>
     </p:spTree>
     <p:extLst>
       <p:ext uri="{BB962C8B-B14F-4D97-AF65-F5344CB8AC3E}">
@@ -12499,6 +13889,13 @@
   <p:clrMapOvr>
     <a:masterClrMapping/>
   </p:clrMapOvr>
+  <p:timing>
+    <p:tnLst>
+      <p:par>
+        <p:cTn xmlns:p14="http://schemas.microsoft.com/office/powerpoint/2010/main" id="1" dur="indefinite" restart="never" nodeType="tmRoot"/>
+      </p:par>
+    </p:tnLst>
+  </p:timing>
 </p:sld>
 </file>
 
@@ -12578,8 +13975,12 @@
               <a:buChar char="•"/>
             </a:pPr>
             <a:r>
+              <a:rPr lang="en-US" dirty="0"/>
+              <a:t>C</a:t>
+            </a:r>
+            <a:r>
               <a:rPr lang="en-US" dirty="0" smtClean="0"/>
-              <a:t>checks combinations </a:t>
+              <a:t>hecks combinations </a:t>
             </a:r>
           </a:p>
           <a:p>
@@ -13290,6 +14691,13 @@
   <p:clrMapOvr>
     <a:masterClrMapping/>
   </p:clrMapOvr>
+  <p:timing>
+    <p:tnLst>
+      <p:par>
+        <p:cTn xmlns:p14="http://schemas.microsoft.com/office/powerpoint/2010/main" id="1" dur="indefinite" restart="never" nodeType="tmRoot"/>
+      </p:par>
+    </p:tnLst>
+  </p:timing>
 </p:sld>
 </file>
 
@@ -13507,6 +14915,13 @@
   <p:clrMapOvr>
     <a:masterClrMapping/>
   </p:clrMapOvr>
+  <p:timing>
+    <p:tnLst>
+      <p:par>
+        <p:cTn xmlns:p14="http://schemas.microsoft.com/office/powerpoint/2010/main" id="1" dur="indefinite" restart="never" nodeType="tmRoot"/>
+      </p:par>
+    </p:tnLst>
+  </p:timing>
 </p:sld>
 </file>
 
@@ -14285,6 +15700,13 @@
   <p:clrMapOvr>
     <a:masterClrMapping/>
   </p:clrMapOvr>
+  <p:timing>
+    <p:tnLst>
+      <p:par>
+        <p:cTn xmlns:p14="http://schemas.microsoft.com/office/powerpoint/2010/main" id="1" dur="indefinite" restart="never" nodeType="tmRoot"/>
+      </p:par>
+    </p:tnLst>
+  </p:timing>
 </p:sld>
 </file>
 

</xml_diff>